<commit_message>
Update Progress Presentation Slides.pptx
</commit_message>
<xml_diff>
--- a/Documentation/Progress Presentation Slides.pptx
+++ b/Documentation/Progress Presentation Slides.pptx
@@ -207,7 +207,7 @@
           <a:p>
             <a:fld id="{DAEF76B9-E9FF-774A-9E46-0D0B90BADCBB}" type="datetimeFigureOut">
               <a:rPr lang="en-US" smtClean="0"/>
-              <a:t>12/3/2019</a:t>
+              <a:t>12/5/2019</a:t>
             </a:fld>
             <a:endParaRPr lang="en-US"/>
           </a:p>
@@ -1037,7 +1037,7 @@
           <a:p>
             <a:fld id="{FC0C9992-D564-8F43-A812-989B229A3387}" type="datetime1">
               <a:rPr lang="en-GB" smtClean="0"/>
-              <a:t>03/12/2019</a:t>
+              <a:t>05/12/2019</a:t>
             </a:fld>
             <a:endParaRPr lang="en-US" dirty="0"/>
           </a:p>
@@ -1245,7 +1245,7 @@
           <a:p>
             <a:fld id="{BA3498A9-234C-3D47-9B7B-575499D6038F}" type="datetime1">
               <a:rPr lang="en-GB" smtClean="0"/>
-              <a:t>03/12/2019</a:t>
+              <a:t>05/12/2019</a:t>
             </a:fld>
             <a:endParaRPr lang="en-US"/>
           </a:p>
@@ -1501,7 +1501,7 @@
           <a:p>
             <a:fld id="{5CAD6ADB-BF9C-AE4B-8CC2-B0E225FDCDAC}" type="datetime1">
               <a:rPr lang="en-GB" smtClean="0"/>
-              <a:t>03/12/2019</a:t>
+              <a:t>05/12/2019</a:t>
             </a:fld>
             <a:endParaRPr lang="en-US"/>
           </a:p>
@@ -1675,7 +1675,7 @@
           <a:p>
             <a:fld id="{64F67A28-D9CD-B14B-9065-E6FA59CC39B1}" type="datetime1">
               <a:rPr lang="en-GB" smtClean="0"/>
-              <a:t>03/12/2019</a:t>
+              <a:t>05/12/2019</a:t>
             </a:fld>
             <a:endParaRPr lang="en-US" dirty="0"/>
           </a:p>
@@ -2018,7 +2018,7 @@
           <a:p>
             <a:fld id="{BAF83EFA-9F07-B646-82E7-F0B8C29DC4F4}" type="datetime1">
               <a:rPr lang="en-GB" smtClean="0"/>
-              <a:t>03/12/2019</a:t>
+              <a:t>05/12/2019</a:t>
             </a:fld>
             <a:endParaRPr lang="en-US" dirty="0"/>
           </a:p>
@@ -2293,7 +2293,7 @@
           <a:p>
             <a:fld id="{1FECFA09-528F-644E-8672-EF9CB3B325EF}" type="datetime1">
               <a:rPr lang="en-GB" smtClean="0"/>
-              <a:t>03/12/2019</a:t>
+              <a:t>05/12/2019</a:t>
             </a:fld>
             <a:endParaRPr lang="en-US" dirty="0"/>
           </a:p>
@@ -2677,7 +2677,7 @@
           <a:p>
             <a:fld id="{750EB149-0DED-D143-9D84-43967A39B20C}" type="datetime1">
               <a:rPr lang="en-GB" smtClean="0"/>
-              <a:t>03/12/2019</a:t>
+              <a:t>05/12/2019</a:t>
             </a:fld>
             <a:endParaRPr lang="en-US"/>
           </a:p>
@@ -2800,7 +2800,7 @@
           <a:p>
             <a:fld id="{8713AA17-48D5-954D-96C3-5278B6B4B8BF}" type="datetime1">
               <a:rPr lang="en-GB" smtClean="0"/>
-              <a:t>03/12/2019</a:t>
+              <a:t>05/12/2019</a:t>
             </a:fld>
             <a:endParaRPr lang="en-US"/>
           </a:p>
@@ -2971,7 +2971,7 @@
           <a:p>
             <a:fld id="{FE3CF40F-1791-3D43-A364-B988B11AABB0}" type="datetime1">
               <a:rPr lang="en-GB" smtClean="0"/>
-              <a:t>03/12/2019</a:t>
+              <a:t>05/12/2019</a:t>
             </a:fld>
             <a:endParaRPr lang="en-US"/>
           </a:p>
@@ -3325,7 +3325,7 @@
           <a:p>
             <a:fld id="{FE60D346-4D79-FD4E-83D0-5197F8275F86}" type="datetime1">
               <a:rPr lang="en-GB" smtClean="0"/>
-              <a:t>03/12/2019</a:t>
+              <a:t>05/12/2019</a:t>
             </a:fld>
             <a:endParaRPr lang="en-US"/>
           </a:p>
@@ -3712,7 +3712,7 @@
           <a:p>
             <a:fld id="{CAA82B5C-7518-5647-93FD-49B071B5A9CF}" type="datetime1">
               <a:rPr lang="en-GB" smtClean="0"/>
-              <a:t>03/12/2019</a:t>
+              <a:t>05/12/2019</a:t>
             </a:fld>
             <a:endParaRPr lang="en-US"/>
           </a:p>
@@ -10251,10 +10251,10 @@
       </p:pic>
       <p:pic>
         <p:nvPicPr>
-          <p:cNvPr id="7" name="Picture 6">
+          <p:cNvPr id="5" name="Picture 4">
             <a:extLst>
               <a:ext uri="{FF2B5EF4-FFF2-40B4-BE49-F238E27FC236}">
-                <a16:creationId xmlns:a16="http://schemas.microsoft.com/office/drawing/2014/main" id="{B04DFCDF-EA42-4C37-A6F4-52F320D53AA1}"/>
+                <a16:creationId xmlns:a16="http://schemas.microsoft.com/office/drawing/2014/main" id="{75C903D8-1597-4C45-B2D8-102C106DE8E5}"/>
               </a:ext>
             </a:extLst>
           </p:cNvPr>
@@ -10271,8 +10271,8 @@
         </p:blipFill>
         <p:spPr>
           <a:xfrm>
-            <a:off x="1106583" y="3405198"/>
-            <a:ext cx="9988137" cy="2463896"/>
+            <a:off x="1097280" y="3286524"/>
+            <a:ext cx="9997440" cy="2488186"/>
           </a:xfrm>
           <a:prstGeom prst="rect">
             <a:avLst/>

</xml_diff>